<commit_message>
Swap Frame for image
</commit_message>
<xml_diff>
--- a/templates/example_prs.pptx
+++ b/templates/example_prs.pptx
@@ -6,6 +6,7 @@
   </p:sldMasterIdLst>
   <p:sldIdLst>
     <p:sldId id="256" r:id="rId2"/>
+    <p:sldId id="257" r:id="rId3"/>
   </p:sldIdLst>
   <p:sldSz cx="12192000" cy="6858000"/>
   <p:notesSz cx="6858000" cy="9144000"/>
@@ -104,6 +105,11 @@
       </a:defRPr>
     </a:lvl9pPr>
   </p:defaultTextStyle>
+  <p:extLst>
+    <p:ext uri="{EFAFB233-063F-42B5-8137-9DF3F51BA10A}">
+      <p15:sldGuideLst xmlns:p15="http://schemas.microsoft.com/office/powerpoint/2012/main"/>
+    </p:ext>
+  </p:extLst>
 </p:presentation>
 </file>
 
@@ -260,7 +266,7 @@
           <a:p>
             <a:fld id="{C128FA71-3A18-48C0-980F-4B68F7F63042}" type="datetime1">
               <a:rPr lang="en-US" smtClean="0"/>
-              <a:t>9/2/2025</a:t>
+              <a:t>9/3/2025</a:t>
             </a:fld>
             <a:endParaRPr lang="en-US"/>
           </a:p>
@@ -468,7 +474,7 @@
           <a:p>
             <a:fld id="{7104EDB3-C0E8-45F8-9E1D-1B6C8D1880C0}" type="datetime1">
               <a:rPr lang="en-US" smtClean="0"/>
-              <a:t>9/2/2025</a:t>
+              <a:t>9/3/2025</a:t>
             </a:fld>
             <a:endParaRPr lang="en-US"/>
           </a:p>
@@ -678,7 +684,7 @@
           <a:p>
             <a:fld id="{9CF0EC4B-54ED-4041-B552-9BA760FA3DBA}" type="datetime1">
               <a:rPr lang="en-US" smtClean="0"/>
-              <a:t>9/2/2025</a:t>
+              <a:t>9/3/2025</a:t>
             </a:fld>
             <a:endParaRPr lang="en-US"/>
           </a:p>
@@ -876,7 +882,7 @@
           <a:p>
             <a:fld id="{51C1210E-201E-4473-82AC-2466F5386C38}" type="datetime1">
               <a:rPr lang="en-US" smtClean="0"/>
-              <a:t>9/2/2025</a:t>
+              <a:t>9/3/2025</a:t>
             </a:fld>
             <a:endParaRPr lang="en-US"/>
           </a:p>
@@ -1154,7 +1160,7 @@
           <a:p>
             <a:fld id="{B01EA198-6CAB-4B8F-B93F-1F9C8C4B6CE7}" type="datetime1">
               <a:rPr lang="en-US" smtClean="0"/>
-              <a:t>9/2/2025</a:t>
+              <a:t>9/3/2025</a:t>
             </a:fld>
             <a:endParaRPr lang="en-US"/>
           </a:p>
@@ -1426,7 +1432,7 @@
           <a:p>
             <a:fld id="{CA06041F-4525-44D5-AA4F-332294BF1F56}" type="datetime1">
               <a:rPr lang="en-US" smtClean="0"/>
-              <a:t>9/2/2025</a:t>
+              <a:t>9/3/2025</a:t>
             </a:fld>
             <a:endParaRPr lang="en-US"/>
           </a:p>
@@ -1850,7 +1856,7 @@
           <a:p>
             <a:fld id="{F9557091-BBDF-4EB9-BA6B-2BB67AC4FC0F}" type="datetime1">
               <a:rPr lang="en-US" smtClean="0"/>
-              <a:t>9/2/2025</a:t>
+              <a:t>9/3/2025</a:t>
             </a:fld>
             <a:endParaRPr lang="en-US"/>
           </a:p>
@@ -1991,7 +1997,7 @@
           <a:p>
             <a:fld id="{2D6B226B-77A6-410C-9796-083F278E0125}" type="datetime1">
               <a:rPr lang="en-US" smtClean="0"/>
-              <a:t>9/2/2025</a:t>
+              <a:t>9/3/2025</a:t>
             </a:fld>
             <a:endParaRPr lang="en-US"/>
           </a:p>
@@ -2104,7 +2110,7 @@
           <a:p>
             <a:fld id="{A23A578B-D289-4C40-8593-3D356C49DA58}" type="datetime1">
               <a:rPr lang="en-US" smtClean="0"/>
-              <a:t>9/2/2025</a:t>
+              <a:t>9/3/2025</a:t>
             </a:fld>
             <a:endParaRPr lang="en-US"/>
           </a:p>
@@ -2423,7 +2429,7 @@
           <a:p>
             <a:fld id="{713DFAE3-14DB-48A7-A80F-80DDB072CE3D}" type="datetime1">
               <a:rPr lang="en-US" smtClean="0"/>
-              <a:t>9/2/2025</a:t>
+              <a:t>9/3/2025</a:t>
             </a:fld>
             <a:endParaRPr lang="en-US"/>
           </a:p>
@@ -2717,7 +2723,7 @@
           <a:p>
             <a:fld id="{92C5EAEF-6478-4102-8F5D-A5FE9FC97ACB}" type="datetime1">
               <a:rPr lang="en-US" smtClean="0"/>
-              <a:t>9/2/2025</a:t>
+              <a:t>9/3/2025</a:t>
             </a:fld>
             <a:endParaRPr lang="en-US"/>
           </a:p>
@@ -2958,7 +2964,7 @@
           <a:p>
             <a:fld id="{67F45AC6-C491-4585-A584-9CE2AF7D5500}" type="datetime1">
               <a:rPr lang="en-US" smtClean="0"/>
-              <a:t>9/2/2025</a:t>
+              <a:t>9/3/2025</a:t>
             </a:fld>
             <a:endParaRPr lang="en-US"/>
           </a:p>
@@ -3721,6 +3727,56 @@
           </a:p>
         </p:txBody>
       </p:sp>
+      <p:sp>
+        <p:nvSpPr>
+          <p:cNvPr id="5" name="Frame 4" descr="small">
+            <a:extLst>
+              <a:ext uri="{FF2B5EF4-FFF2-40B4-BE49-F238E27FC236}">
+                <a16:creationId xmlns:a16="http://schemas.microsoft.com/office/drawing/2014/main" id="{053DA6AB-3A42-7265-6B64-20C526793721}"/>
+              </a:ext>
+            </a:extLst>
+          </p:cNvPr>
+          <p:cNvSpPr/>
+          <p:nvPr/>
+        </p:nvSpPr>
+        <p:spPr>
+          <a:xfrm>
+            <a:off x="286506" y="4289046"/>
+            <a:ext cx="2387868" cy="2210077"/>
+          </a:xfrm>
+          <a:prstGeom prst="frame">
+            <a:avLst/>
+          </a:prstGeom>
+        </p:spPr>
+        <p:style>
+          <a:lnRef idx="2">
+            <a:schemeClr val="accent1">
+              <a:shade val="15000"/>
+            </a:schemeClr>
+          </a:lnRef>
+          <a:fillRef idx="1">
+            <a:schemeClr val="accent1"/>
+          </a:fillRef>
+          <a:effectRef idx="0">
+            <a:schemeClr val="accent1"/>
+          </a:effectRef>
+          <a:fontRef idx="minor">
+            <a:schemeClr val="lt1"/>
+          </a:fontRef>
+        </p:style>
+        <p:txBody>
+          <a:bodyPr rtlCol="0" anchor="ctr"/>
+          <a:lstStyle/>
+          <a:p>
+            <a:pPr algn="ctr"/>
+            <a:endParaRPr lang="en-GB">
+              <a:solidFill>
+                <a:schemeClr val="tx1"/>
+              </a:solidFill>
+            </a:endParaRPr>
+          </a:p>
+        </p:txBody>
+      </p:sp>
     </p:spTree>
     <p:extLst>
       <p:ext uri="{BB962C8B-B14F-4D97-AF65-F5344CB8AC3E}">
@@ -3868,6 +3924,266 @@
     <p:bldLst>
       <p:bldP spid="2" grpId="0"/>
       <p:bldP spid="3" grpId="0" build="p"/>
+    </p:bldLst>
+  </p:timing>
+</p:sld>
+</file>
+
+<file path=ppt/slides/slide2.xml><?xml version="1.0" encoding="utf-8"?>
+<p:sld xmlns:a="http://schemas.openxmlformats.org/drawingml/2006/main" xmlns:r="http://schemas.openxmlformats.org/officeDocument/2006/relationships" xmlns:p="http://schemas.openxmlformats.org/presentationml/2006/main">
+  <p:cSld>
+    <p:spTree>
+      <p:nvGrpSpPr>
+        <p:cNvPr id="1" name="">
+          <a:extLst>
+            <a:ext uri="{FF2B5EF4-FFF2-40B4-BE49-F238E27FC236}">
+              <a16:creationId xmlns:a16="http://schemas.microsoft.com/office/drawing/2014/main" id="{B7C7C99C-CED7-3AA8-10CF-21A8BB82E900}"/>
+            </a:ext>
+          </a:extLst>
+        </p:cNvPr>
+        <p:cNvGrpSpPr/>
+        <p:nvPr/>
+      </p:nvGrpSpPr>
+      <p:grpSpPr>
+        <a:xfrm>
+          <a:off x="0" y="0"/>
+          <a:ext cx="0" cy="0"/>
+          <a:chOff x="0" y="0"/>
+          <a:chExt cx="0" cy="0"/>
+        </a:xfrm>
+      </p:grpSpPr>
+      <p:pic>
+        <p:nvPicPr>
+          <p:cNvPr id="4" name="Picture 3">
+            <a:extLst>
+              <a:ext uri="{FF2B5EF4-FFF2-40B4-BE49-F238E27FC236}">
+                <a16:creationId xmlns:a16="http://schemas.microsoft.com/office/drawing/2014/main" id="{51B57B5B-CAE1-AB75-FA83-74FE9FF2C024}"/>
+              </a:ext>
+            </a:extLst>
+          </p:cNvPr>
+          <p:cNvPicPr>
+            <a:picLocks noChangeAspect="1"/>
+          </p:cNvPicPr>
+          <p:nvPr/>
+        </p:nvPicPr>
+        <p:blipFill>
+          <a:blip r:embed="rId2"/>
+          <a:srcRect b="1747"/>
+          <a:stretch>
+            <a:fillRect/>
+          </a:stretch>
+        </p:blipFill>
+        <p:spPr>
+          <a:xfrm>
+            <a:off x="20" y="10"/>
+            <a:ext cx="12191980" cy="6857990"/>
+          </a:xfrm>
+          <a:prstGeom prst="rect">
+            <a:avLst/>
+          </a:prstGeom>
+        </p:spPr>
+      </p:pic>
+      <p:sp>
+        <p:nvSpPr>
+          <p:cNvPr id="10" name="Frame 9" descr="big">
+            <a:extLst>
+              <a:ext uri="{FF2B5EF4-FFF2-40B4-BE49-F238E27FC236}">
+                <a16:creationId xmlns:a16="http://schemas.microsoft.com/office/drawing/2014/main" id="{87BB0333-3513-0C14-C061-49FB97CB9177}"/>
+              </a:ext>
+            </a:extLst>
+          </p:cNvPr>
+          <p:cNvSpPr/>
+          <p:nvPr/>
+        </p:nvSpPr>
+        <p:spPr>
+          <a:xfrm>
+            <a:off x="3432827" y="533124"/>
+            <a:ext cx="4777107" cy="4668141"/>
+          </a:xfrm>
+          <a:prstGeom prst="frame">
+            <a:avLst/>
+          </a:prstGeom>
+        </p:spPr>
+        <p:style>
+          <a:lnRef idx="2">
+            <a:schemeClr val="accent1">
+              <a:shade val="15000"/>
+            </a:schemeClr>
+          </a:lnRef>
+          <a:fillRef idx="1">
+            <a:schemeClr val="accent1"/>
+          </a:fillRef>
+          <a:effectRef idx="0">
+            <a:schemeClr val="accent1"/>
+          </a:effectRef>
+          <a:fontRef idx="minor">
+            <a:schemeClr val="lt1"/>
+          </a:fontRef>
+        </p:style>
+        <p:txBody>
+          <a:bodyPr rtlCol="0" anchor="ctr"/>
+          <a:lstStyle/>
+          <a:p>
+            <a:pPr algn="ctr"/>
+            <a:endParaRPr lang="en-GB">
+              <a:solidFill>
+                <a:schemeClr val="tx1"/>
+              </a:solidFill>
+            </a:endParaRPr>
+          </a:p>
+        </p:txBody>
+      </p:sp>
+      <p:sp>
+        <p:nvSpPr>
+          <p:cNvPr id="12" name="Subtitle 2">
+            <a:extLst>
+              <a:ext uri="{FF2B5EF4-FFF2-40B4-BE49-F238E27FC236}">
+                <a16:creationId xmlns:a16="http://schemas.microsoft.com/office/drawing/2014/main" id="{141B2D12-2199-19BF-D256-7BA73A050467}"/>
+              </a:ext>
+            </a:extLst>
+          </p:cNvPr>
+          <p:cNvSpPr>
+            <a:spLocks noGrp="1"/>
+          </p:cNvSpPr>
+          <p:nvPr>
+            <p:ph type="subTitle" idx="1"/>
+          </p:nvPr>
+        </p:nvSpPr>
+        <p:spPr>
+          <a:xfrm>
+            <a:off x="3220933" y="5280990"/>
+            <a:ext cx="5200894" cy="1290807"/>
+          </a:xfrm>
+        </p:spPr>
+        <p:txBody>
+          <a:bodyPr anchor="ctr">
+            <a:normAutofit/>
+          </a:bodyPr>
+          <a:lstStyle/>
+          <a:p>
+            <a:r>
+              <a:rPr lang="en-GB" sz="4000" b="1" i="1" dirty="0">
+                <a:effectLst>
+                  <a:outerShdw blurRad="38100" dist="38100" dir="2700000" algn="tl">
+                    <a:srgbClr val="000000">
+                      <a:alpha val="43137"/>
+                    </a:srgbClr>
+                  </a:outerShdw>
+                </a:effectLst>
+              </a:rPr>
+              <a:t>{{AUTHOR}}</a:t>
+            </a:r>
+          </a:p>
+        </p:txBody>
+      </p:sp>
+    </p:spTree>
+    <p:extLst>
+      <p:ext uri="{BB962C8B-B14F-4D97-AF65-F5344CB8AC3E}">
+        <p14:creationId xmlns:p14="http://schemas.microsoft.com/office/powerpoint/2010/main" val="3977573283"/>
+      </p:ext>
+    </p:extLst>
+  </p:cSld>
+  <p:clrMapOvr>
+    <a:masterClrMapping/>
+  </p:clrMapOvr>
+  <p:timing>
+    <p:tnLst>
+      <p:par>
+        <p:cTn id="1" dur="indefinite" restart="never" nodeType="tmRoot">
+          <p:childTnLst>
+            <p:seq concurrent="1" nextAc="seek">
+              <p:cTn id="2" dur="indefinite" nodeType="mainSeq">
+                <p:childTnLst>
+                  <p:par>
+                    <p:cTn id="3" fill="hold">
+                      <p:stCondLst>
+                        <p:cond delay="indefinite"/>
+                        <p:cond evt="onBegin" delay="0">
+                          <p:tn val="2"/>
+                        </p:cond>
+                      </p:stCondLst>
+                      <p:childTnLst>
+                        <p:par>
+                          <p:cTn id="4" fill="hold">
+                            <p:stCondLst>
+                              <p:cond delay="0"/>
+                            </p:stCondLst>
+                            <p:childTnLst>
+                              <p:par>
+                                <p:cTn id="5" presetID="10" presetClass="entr" presetSubtype="0" fill="hold" grpId="0" nodeType="withEffect">
+                                  <p:stCondLst>
+                                    <p:cond delay="1500"/>
+                                  </p:stCondLst>
+                                  <p:iterate>
+                                    <p:tmPct val="10000"/>
+                                  </p:iterate>
+                                  <p:childTnLst>
+                                    <p:set>
+                                      <p:cBhvr>
+                                        <p:cTn id="6" dur="1" fill="hold">
+                                          <p:stCondLst>
+                                            <p:cond delay="0"/>
+                                          </p:stCondLst>
+                                        </p:cTn>
+                                        <p:tgtEl>
+                                          <p:spTgt spid="12">
+                                            <p:txEl>
+                                              <p:pRg st="0" end="0"/>
+                                            </p:txEl>
+                                          </p:spTgt>
+                                        </p:tgtEl>
+                                        <p:attrNameLst>
+                                          <p:attrName>style.visibility</p:attrName>
+                                        </p:attrNameLst>
+                                      </p:cBhvr>
+                                      <p:to>
+                                        <p:strVal val="visible"/>
+                                      </p:to>
+                                    </p:set>
+                                    <p:animEffect transition="in" filter="fade">
+                                      <p:cBhvr>
+                                        <p:cTn id="7" dur="700"/>
+                                        <p:tgtEl>
+                                          <p:spTgt spid="12">
+                                            <p:txEl>
+                                              <p:pRg st="0" end="0"/>
+                                            </p:txEl>
+                                          </p:spTgt>
+                                        </p:tgtEl>
+                                      </p:cBhvr>
+                                    </p:animEffect>
+                                  </p:childTnLst>
+                                </p:cTn>
+                              </p:par>
+                            </p:childTnLst>
+                          </p:cTn>
+                        </p:par>
+                      </p:childTnLst>
+                    </p:cTn>
+                  </p:par>
+                </p:childTnLst>
+              </p:cTn>
+              <p:prevCondLst>
+                <p:cond evt="onPrev" delay="0">
+                  <p:tgtEl>
+                    <p:sldTgt/>
+                  </p:tgtEl>
+                </p:cond>
+              </p:prevCondLst>
+              <p:nextCondLst>
+                <p:cond evt="onNext" delay="0">
+                  <p:tgtEl>
+                    <p:sldTgt/>
+                  </p:tgtEl>
+                </p:cond>
+              </p:nextCondLst>
+            </p:seq>
+          </p:childTnLst>
+        </p:cTn>
+      </p:par>
+    </p:tnLst>
+    <p:bldLst>
+      <p:bldP spid="12" grpId="0" build="p"/>
     </p:bldLst>
   </p:timing>
 </p:sld>

</xml_diff>